<commit_message>
missing image in presentation
</commit_message>
<xml_diff>
--- a/slides/2011/Beginning iOS Development A Deeper Look.pptx
+++ b/slides/2011/Beginning iOS Development A Deeper Look.pptx
@@ -16047,7 +16047,7 @@
       </p:sp>
       <p:grpSp>
         <p:nvGrpSpPr>
-          <p:cNvPr id="10" name="Group 9"/>
+          <p:cNvPr id="5" name="Group 4"/>
           <p:cNvGrpSpPr/>
           <p:nvPr/>
         </p:nvGrpSpPr>
@@ -16055,40 +16055,40 @@
           <a:xfrm>
             <a:off x="1492380" y="3664767"/>
             <a:ext cx="7346821" cy="1098058"/>
-            <a:chOff x="1492380" y="4610072"/>
+            <a:chOff x="1492380" y="3664767"/>
             <a:chExt cx="7346821" cy="1098058"/>
           </a:xfrm>
         </p:grpSpPr>
         <p:grpSp>
           <p:nvGrpSpPr>
-            <p:cNvPr id="39" name="Group 38"/>
+            <p:cNvPr id="4" name="Group 3"/>
             <p:cNvGrpSpPr/>
             <p:nvPr/>
           </p:nvGrpSpPr>
           <p:grpSpPr>
             <a:xfrm>
-              <a:off x="1492380" y="4610072"/>
+              <a:off x="1492380" y="3664767"/>
               <a:ext cx="1081559" cy="1098058"/>
-              <a:chOff x="2585534" y="2275528"/>
+              <a:chOff x="1492380" y="3664767"/>
               <a:chExt cx="1081559" cy="1098058"/>
             </a:xfrm>
           </p:grpSpPr>
           <p:sp>
             <p:nvSpPr>
-              <p:cNvPr id="28" name="Rounded Rectangle 27"/>
+              <p:cNvPr id="11" name="Rounded Rectangle 10"/>
               <p:cNvSpPr/>
               <p:nvPr/>
             </p:nvSpPr>
             <p:spPr>
               <a:xfrm>
-                <a:off x="2713051" y="2275528"/>
+                <a:off x="1619897" y="3664767"/>
                 <a:ext cx="827452" cy="827452"/>
               </a:xfrm>
               <a:prstGeom prst="roundRect">
                 <a:avLst/>
               </a:prstGeom>
               <a:blipFill rotWithShape="1">
-                <a:blip/>
+                <a:blip r:embed="rId3"/>
                 <a:stretch>
                   <a:fillRect/>
                 </a:stretch>
@@ -16128,7 +16128,7 @@
             </p:nvSpPr>
             <p:spPr>
               <a:xfrm>
-                <a:off x="2585534" y="3065809"/>
+                <a:off x="1492380" y="4455048"/>
                 <a:ext cx="1081559" cy="307777"/>
               </a:xfrm>
               <a:prstGeom prst="rect">
@@ -16178,7 +16178,7 @@
           </p:nvSpPr>
           <p:spPr>
             <a:xfrm>
-              <a:off x="2719667" y="4610072"/>
+              <a:off x="2719667" y="3664767"/>
               <a:ext cx="6119534" cy="810550"/>
             </a:xfrm>
             <a:prstGeom prst="rect">

</xml_diff>